<commit_message>
2.1 motion cap & 3.3 cameraset
</commit_message>
<xml_diff>
--- a/paper figure.pptx
+++ b/paper figure.pptx
@@ -291,7 +291,7 @@
           <a:p>
             <a:fld id="{57BB4548-A917-4321-B6F0-C21F28AC35DC}" type="datetimeFigureOut">
               <a:rPr lang="zh-TW" altLang="en-US" smtClean="0"/>
-              <a:t>2024/6/6</a:t>
+              <a:t>2024/6/7</a:t>
             </a:fld>
             <a:endParaRPr lang="zh-TW" altLang="en-US"/>
           </a:p>
@@ -489,7 +489,7 @@
           <a:p>
             <a:fld id="{57BB4548-A917-4321-B6F0-C21F28AC35DC}" type="datetimeFigureOut">
               <a:rPr lang="zh-TW" altLang="en-US" smtClean="0"/>
-              <a:t>2024/6/6</a:t>
+              <a:t>2024/6/7</a:t>
             </a:fld>
             <a:endParaRPr lang="zh-TW" altLang="en-US"/>
           </a:p>
@@ -697,7 +697,7 @@
           <a:p>
             <a:fld id="{57BB4548-A917-4321-B6F0-C21F28AC35DC}" type="datetimeFigureOut">
               <a:rPr lang="zh-TW" altLang="en-US" smtClean="0"/>
-              <a:t>2024/6/6</a:t>
+              <a:t>2024/6/7</a:t>
             </a:fld>
             <a:endParaRPr lang="zh-TW" altLang="en-US"/>
           </a:p>
@@ -895,7 +895,7 @@
           <a:p>
             <a:fld id="{57BB4548-A917-4321-B6F0-C21F28AC35DC}" type="datetimeFigureOut">
               <a:rPr lang="zh-TW" altLang="en-US" smtClean="0"/>
-              <a:t>2024/6/6</a:t>
+              <a:t>2024/6/7</a:t>
             </a:fld>
             <a:endParaRPr lang="zh-TW" altLang="en-US"/>
           </a:p>
@@ -1170,7 +1170,7 @@
           <a:p>
             <a:fld id="{57BB4548-A917-4321-B6F0-C21F28AC35DC}" type="datetimeFigureOut">
               <a:rPr lang="zh-TW" altLang="en-US" smtClean="0"/>
-              <a:t>2024/6/6</a:t>
+              <a:t>2024/6/7</a:t>
             </a:fld>
             <a:endParaRPr lang="zh-TW" altLang="en-US"/>
           </a:p>
@@ -1435,7 +1435,7 @@
           <a:p>
             <a:fld id="{57BB4548-A917-4321-B6F0-C21F28AC35DC}" type="datetimeFigureOut">
               <a:rPr lang="zh-TW" altLang="en-US" smtClean="0"/>
-              <a:t>2024/6/6</a:t>
+              <a:t>2024/6/7</a:t>
             </a:fld>
             <a:endParaRPr lang="zh-TW" altLang="en-US"/>
           </a:p>
@@ -1847,7 +1847,7 @@
           <a:p>
             <a:fld id="{57BB4548-A917-4321-B6F0-C21F28AC35DC}" type="datetimeFigureOut">
               <a:rPr lang="zh-TW" altLang="en-US" smtClean="0"/>
-              <a:t>2024/6/6</a:t>
+              <a:t>2024/6/7</a:t>
             </a:fld>
             <a:endParaRPr lang="zh-TW" altLang="en-US"/>
           </a:p>
@@ -1988,7 +1988,7 @@
           <a:p>
             <a:fld id="{57BB4548-A917-4321-B6F0-C21F28AC35DC}" type="datetimeFigureOut">
               <a:rPr lang="zh-TW" altLang="en-US" smtClean="0"/>
-              <a:t>2024/6/6</a:t>
+              <a:t>2024/6/7</a:t>
             </a:fld>
             <a:endParaRPr lang="zh-TW" altLang="en-US"/>
           </a:p>
@@ -2101,7 +2101,7 @@
           <a:p>
             <a:fld id="{57BB4548-A917-4321-B6F0-C21F28AC35DC}" type="datetimeFigureOut">
               <a:rPr lang="zh-TW" altLang="en-US" smtClean="0"/>
-              <a:t>2024/6/6</a:t>
+              <a:t>2024/6/7</a:t>
             </a:fld>
             <a:endParaRPr lang="zh-TW" altLang="en-US"/>
           </a:p>
@@ -2412,7 +2412,7 @@
           <a:p>
             <a:fld id="{57BB4548-A917-4321-B6F0-C21F28AC35DC}" type="datetimeFigureOut">
               <a:rPr lang="zh-TW" altLang="en-US" smtClean="0"/>
-              <a:t>2024/6/6</a:t>
+              <a:t>2024/6/7</a:t>
             </a:fld>
             <a:endParaRPr lang="zh-TW" altLang="en-US"/>
           </a:p>
@@ -2700,7 +2700,7 @@
           <a:p>
             <a:fld id="{57BB4548-A917-4321-B6F0-C21F28AC35DC}" type="datetimeFigureOut">
               <a:rPr lang="zh-TW" altLang="en-US" smtClean="0"/>
-              <a:t>2024/6/6</a:t>
+              <a:t>2024/6/7</a:t>
             </a:fld>
             <a:endParaRPr lang="zh-TW" altLang="en-US"/>
           </a:p>
@@ -2941,7 +2941,7 @@
           <a:p>
             <a:fld id="{57BB4548-A917-4321-B6F0-C21F28AC35DC}" type="datetimeFigureOut">
               <a:rPr lang="zh-TW" altLang="en-US" smtClean="0"/>
-              <a:t>2024/6/6</a:t>
+              <a:t>2024/6/7</a:t>
             </a:fld>
             <a:endParaRPr lang="zh-TW" altLang="en-US"/>
           </a:p>
@@ -4023,10 +4023,10 @@
       </p:sp>
       <p:grpSp>
         <p:nvGrpSpPr>
-          <p:cNvPr id="22" name="群組 21">
-            <a:extLst>
-              <a:ext uri="{FF2B5EF4-FFF2-40B4-BE49-F238E27FC236}">
-                <a16:creationId xmlns:a16="http://schemas.microsoft.com/office/drawing/2014/main" id="{3D6B1869-227F-4E8E-97C5-ADFECC4F1638}"/>
+          <p:cNvPr id="30" name="群組 29">
+            <a:extLst>
+              <a:ext uri="{FF2B5EF4-FFF2-40B4-BE49-F238E27FC236}">
+                <a16:creationId xmlns:a16="http://schemas.microsoft.com/office/drawing/2014/main" id="{BAF19B38-B221-4C0C-94E7-BFD234BA7B82}"/>
               </a:ext>
             </a:extLst>
           </p:cNvPr>
@@ -4035,66 +4035,731 @@
         </p:nvGrpSpPr>
         <p:grpSpPr>
           <a:xfrm>
-            <a:off x="3342000" y="1369291"/>
-            <a:ext cx="5508000" cy="4119418"/>
-            <a:chOff x="3342000" y="1369291"/>
-            <a:chExt cx="5508000" cy="4119418"/>
+            <a:off x="2856000" y="546874"/>
+            <a:ext cx="7253314" cy="5042125"/>
+            <a:chOff x="2856000" y="546874"/>
+            <a:chExt cx="7253314" cy="5042125"/>
           </a:xfrm>
         </p:grpSpPr>
-        <p:sp>
-          <p:nvSpPr>
-            <p:cNvPr id="5" name="矩形 4">
+        <p:grpSp>
+          <p:nvGrpSpPr>
+            <p:cNvPr id="2" name="群組 1">
               <a:extLst>
                 <a:ext uri="{FF2B5EF4-FFF2-40B4-BE49-F238E27FC236}">
-                  <a16:creationId xmlns:a16="http://schemas.microsoft.com/office/drawing/2014/main" id="{2CDA8655-B19C-4482-890A-45D78FF08B21}"/>
+                  <a16:creationId xmlns:a16="http://schemas.microsoft.com/office/drawing/2014/main" id="{20D9F317-1986-496C-B41C-3BBDB4D73BD0}"/>
                 </a:ext>
               </a:extLst>
             </p:cNvPr>
-            <p:cNvSpPr/>
+            <p:cNvGrpSpPr/>
             <p:nvPr/>
-          </p:nvSpPr>
-          <p:spPr>
+          </p:nvGrpSpPr>
+          <p:grpSpPr>
             <a:xfrm>
-              <a:off x="3342000" y="1369291"/>
-              <a:ext cx="5508000" cy="4119418"/>
+              <a:off x="2856000" y="1268999"/>
+              <a:ext cx="6480000" cy="4320000"/>
+              <a:chOff x="2856000" y="1268999"/>
+              <a:chExt cx="6480000" cy="4320000"/>
             </a:xfrm>
-            <a:prstGeom prst="rect">
-              <a:avLst/>
-            </a:prstGeom>
-            <a:noFill/>
-            <a:ln w="57150"/>
-          </p:spPr>
-          <p:style>
-            <a:lnRef idx="2">
-              <a:schemeClr val="accent1">
-                <a:shade val="50000"/>
-              </a:schemeClr>
-            </a:lnRef>
-            <a:fillRef idx="1">
-              <a:schemeClr val="accent1"/>
-            </a:fillRef>
-            <a:effectRef idx="0">
-              <a:schemeClr val="accent1"/>
-            </a:effectRef>
-            <a:fontRef idx="minor">
-              <a:schemeClr val="lt1"/>
-            </a:fontRef>
-          </p:style>
-          <p:txBody>
-            <a:bodyPr rtlCol="0" anchor="ctr"/>
-            <a:lstStyle/>
-            <a:p>
-              <a:pPr algn="ctr"/>
-              <a:endParaRPr lang="zh-TW" altLang="en-US" dirty="0"/>
-            </a:p>
-          </p:txBody>
-        </p:sp>
+          </p:grpSpPr>
+          <p:sp>
+            <p:nvSpPr>
+              <p:cNvPr id="5" name="矩形 4">
+                <a:extLst>
+                  <a:ext uri="{FF2B5EF4-FFF2-40B4-BE49-F238E27FC236}">
+                    <a16:creationId xmlns:a16="http://schemas.microsoft.com/office/drawing/2014/main" id="{2CDA8655-B19C-4482-890A-45D78FF08B21}"/>
+                  </a:ext>
+                </a:extLst>
+              </p:cNvPr>
+              <p:cNvSpPr/>
+              <p:nvPr/>
+            </p:nvSpPr>
+            <p:spPr>
+              <a:xfrm>
+                <a:off x="2856000" y="1268999"/>
+                <a:ext cx="6480000" cy="4320000"/>
+              </a:xfrm>
+              <a:prstGeom prst="rect">
+                <a:avLst/>
+              </a:prstGeom>
+              <a:noFill/>
+              <a:ln w="57150"/>
+            </p:spPr>
+            <p:style>
+              <a:lnRef idx="2">
+                <a:schemeClr val="accent1">
+                  <a:shade val="50000"/>
+                </a:schemeClr>
+              </a:lnRef>
+              <a:fillRef idx="1">
+                <a:schemeClr val="accent1"/>
+              </a:fillRef>
+              <a:effectRef idx="0">
+                <a:schemeClr val="accent1"/>
+              </a:effectRef>
+              <a:fontRef idx="minor">
+                <a:schemeClr val="lt1"/>
+              </a:fontRef>
+            </p:style>
+            <p:txBody>
+              <a:bodyPr rtlCol="0" anchor="ctr"/>
+              <a:lstStyle/>
+              <a:p>
+                <a:pPr algn="ctr"/>
+                <a:endParaRPr lang="zh-TW" altLang="en-US" dirty="0"/>
+              </a:p>
+            </p:txBody>
+          </p:sp>
+          <p:sp>
+            <p:nvSpPr>
+              <p:cNvPr id="6" name="文字方塊 5">
+                <a:extLst>
+                  <a:ext uri="{FF2B5EF4-FFF2-40B4-BE49-F238E27FC236}">
+                    <a16:creationId xmlns:a16="http://schemas.microsoft.com/office/drawing/2014/main" id="{821372EA-6A4F-405A-9FBE-224086C8DF1D}"/>
+                  </a:ext>
+                </a:extLst>
+              </p:cNvPr>
+              <p:cNvSpPr txBox="1"/>
+              <p:nvPr/>
+            </p:nvSpPr>
+            <p:spPr>
+              <a:xfrm>
+                <a:off x="6893995" y="5182569"/>
+                <a:ext cx="772968" cy="369332"/>
+              </a:xfrm>
+              <a:prstGeom prst="rect">
+                <a:avLst/>
+              </a:prstGeom>
+              <a:noFill/>
+              <a:ln w="19050">
+                <a:solidFill>
+                  <a:schemeClr val="tx1"/>
+                </a:solidFill>
+                <a:prstDash val="dash"/>
+              </a:ln>
+            </p:spPr>
+            <p:txBody>
+              <a:bodyPr wrap="none" rtlCol="0">
+                <a:spAutoFit/>
+              </a:bodyPr>
+              <a:lstStyle/>
+              <a:p>
+                <a:pPr algn="ctr"/>
+                <a:r>
+                  <a:rPr lang="en-US" altLang="zh-TW" dirty="0"/>
+                  <a:t>Cam 4</a:t>
+                </a:r>
+                <a:endParaRPr lang="zh-TW" altLang="en-US" dirty="0"/>
+              </a:p>
+            </p:txBody>
+          </p:sp>
+          <p:sp>
+            <p:nvSpPr>
+              <p:cNvPr id="7" name="文字方塊 6">
+                <a:extLst>
+                  <a:ext uri="{FF2B5EF4-FFF2-40B4-BE49-F238E27FC236}">
+                    <a16:creationId xmlns:a16="http://schemas.microsoft.com/office/drawing/2014/main" id="{2A49969F-C1BB-44CD-903A-FC1BE547F095}"/>
+                  </a:ext>
+                </a:extLst>
+              </p:cNvPr>
+              <p:cNvSpPr txBox="1"/>
+              <p:nvPr/>
+            </p:nvSpPr>
+            <p:spPr>
+              <a:xfrm>
+                <a:off x="4525037" y="5182569"/>
+                <a:ext cx="772968" cy="369332"/>
+              </a:xfrm>
+              <a:prstGeom prst="rect">
+                <a:avLst/>
+              </a:prstGeom>
+              <a:noFill/>
+              <a:ln w="19050">
+                <a:solidFill>
+                  <a:schemeClr val="tx1"/>
+                </a:solidFill>
+                <a:prstDash val="dash"/>
+              </a:ln>
+            </p:spPr>
+            <p:txBody>
+              <a:bodyPr wrap="none" rtlCol="0">
+                <a:spAutoFit/>
+              </a:bodyPr>
+              <a:lstStyle/>
+              <a:p>
+                <a:pPr algn="ctr"/>
+                <a:r>
+                  <a:rPr lang="en-US" altLang="zh-TW" dirty="0"/>
+                  <a:t>Cam 5</a:t>
+                </a:r>
+                <a:endParaRPr lang="zh-TW" altLang="en-US" dirty="0"/>
+              </a:p>
+            </p:txBody>
+          </p:sp>
+          <p:sp>
+            <p:nvSpPr>
+              <p:cNvPr id="8" name="文字方塊 7">
+                <a:extLst>
+                  <a:ext uri="{FF2B5EF4-FFF2-40B4-BE49-F238E27FC236}">
+                    <a16:creationId xmlns:a16="http://schemas.microsoft.com/office/drawing/2014/main" id="{2CB63C69-8CDE-4493-A986-3A9712A7E493}"/>
+                  </a:ext>
+                </a:extLst>
+              </p:cNvPr>
+              <p:cNvSpPr txBox="1"/>
+              <p:nvPr/>
+            </p:nvSpPr>
+            <p:spPr>
+              <a:xfrm>
+                <a:off x="6893995" y="1278558"/>
+                <a:ext cx="772968" cy="369332"/>
+              </a:xfrm>
+              <a:prstGeom prst="rect">
+                <a:avLst/>
+              </a:prstGeom>
+              <a:noFill/>
+              <a:ln w="19050">
+                <a:solidFill>
+                  <a:schemeClr val="tx1"/>
+                </a:solidFill>
+                <a:prstDash val="dash"/>
+              </a:ln>
+            </p:spPr>
+            <p:txBody>
+              <a:bodyPr wrap="none" rtlCol="0">
+                <a:spAutoFit/>
+              </a:bodyPr>
+              <a:lstStyle/>
+              <a:p>
+                <a:pPr algn="ctr"/>
+                <a:r>
+                  <a:rPr lang="en-US" altLang="zh-TW" dirty="0"/>
+                  <a:t>Cam 1</a:t>
+                </a:r>
+                <a:endParaRPr lang="zh-TW" altLang="en-US" dirty="0"/>
+              </a:p>
+            </p:txBody>
+          </p:sp>
+          <p:sp>
+            <p:nvSpPr>
+              <p:cNvPr id="9" name="文字方塊 8">
+                <a:extLst>
+                  <a:ext uri="{FF2B5EF4-FFF2-40B4-BE49-F238E27FC236}">
+                    <a16:creationId xmlns:a16="http://schemas.microsoft.com/office/drawing/2014/main" id="{EFA2F1C9-CD76-482F-9B76-1CF5F88CDFF9}"/>
+                  </a:ext>
+                </a:extLst>
+              </p:cNvPr>
+              <p:cNvSpPr txBox="1"/>
+              <p:nvPr/>
+            </p:nvSpPr>
+            <p:spPr>
+              <a:xfrm>
+                <a:off x="4525037" y="1269000"/>
+                <a:ext cx="772968" cy="369332"/>
+              </a:xfrm>
+              <a:prstGeom prst="rect">
+                <a:avLst/>
+              </a:prstGeom>
+              <a:noFill/>
+              <a:ln w="19050">
+                <a:solidFill>
+                  <a:schemeClr val="tx1"/>
+                </a:solidFill>
+                <a:prstDash val="dash"/>
+              </a:ln>
+            </p:spPr>
+            <p:txBody>
+              <a:bodyPr wrap="none" rtlCol="0">
+                <a:spAutoFit/>
+              </a:bodyPr>
+              <a:lstStyle/>
+              <a:p>
+                <a:pPr algn="ctr"/>
+                <a:r>
+                  <a:rPr lang="en-US" altLang="zh-TW" dirty="0"/>
+                  <a:t>Cam 8</a:t>
+                </a:r>
+                <a:endParaRPr lang="zh-TW" altLang="en-US" dirty="0"/>
+              </a:p>
+            </p:txBody>
+          </p:sp>
+          <p:sp>
+            <p:nvSpPr>
+              <p:cNvPr id="10" name="文字方塊 9">
+                <a:extLst>
+                  <a:ext uri="{FF2B5EF4-FFF2-40B4-BE49-F238E27FC236}">
+                    <a16:creationId xmlns:a16="http://schemas.microsoft.com/office/drawing/2014/main" id="{D20467EE-5F96-4B24-81C2-5026CD7C9FCB}"/>
+                  </a:ext>
+                </a:extLst>
+              </p:cNvPr>
+              <p:cNvSpPr txBox="1"/>
+              <p:nvPr/>
+            </p:nvSpPr>
+            <p:spPr>
+              <a:xfrm rot="5400000">
+                <a:off x="8732260" y="2554074"/>
+                <a:ext cx="772969" cy="369332"/>
+              </a:xfrm>
+              <a:prstGeom prst="rect">
+                <a:avLst/>
+              </a:prstGeom>
+              <a:noFill/>
+              <a:ln w="19050">
+                <a:solidFill>
+                  <a:schemeClr val="tx1"/>
+                </a:solidFill>
+                <a:prstDash val="dash"/>
+              </a:ln>
+            </p:spPr>
+            <p:txBody>
+              <a:bodyPr wrap="none" rtlCol="0">
+                <a:spAutoFit/>
+              </a:bodyPr>
+              <a:lstStyle/>
+              <a:p>
+                <a:pPr algn="ctr"/>
+                <a:r>
+                  <a:rPr lang="en-US" altLang="zh-TW" dirty="0"/>
+                  <a:t>Cam 2</a:t>
+                </a:r>
+                <a:endParaRPr lang="zh-TW" altLang="en-US" dirty="0"/>
+              </a:p>
+            </p:txBody>
+          </p:sp>
+          <p:sp>
+            <p:nvSpPr>
+              <p:cNvPr id="13" name="文字方塊 12">
+                <a:extLst>
+                  <a:ext uri="{FF2B5EF4-FFF2-40B4-BE49-F238E27FC236}">
+                    <a16:creationId xmlns:a16="http://schemas.microsoft.com/office/drawing/2014/main" id="{6DC3B236-142F-4D02-BC49-F2C340B64E40}"/>
+                  </a:ext>
+                </a:extLst>
+              </p:cNvPr>
+              <p:cNvSpPr txBox="1"/>
+              <p:nvPr/>
+            </p:nvSpPr>
+            <p:spPr>
+              <a:xfrm rot="5400000">
+                <a:off x="8732260" y="3934594"/>
+                <a:ext cx="772969" cy="369332"/>
+              </a:xfrm>
+              <a:prstGeom prst="rect">
+                <a:avLst/>
+              </a:prstGeom>
+              <a:noFill/>
+              <a:ln w="19050">
+                <a:solidFill>
+                  <a:schemeClr val="tx1"/>
+                </a:solidFill>
+                <a:prstDash val="dash"/>
+              </a:ln>
+            </p:spPr>
+            <p:txBody>
+              <a:bodyPr wrap="none" rtlCol="0">
+                <a:spAutoFit/>
+              </a:bodyPr>
+              <a:lstStyle/>
+              <a:p>
+                <a:pPr algn="ctr"/>
+                <a:r>
+                  <a:rPr lang="en-US" altLang="zh-TW" dirty="0"/>
+                  <a:t>Cam 3</a:t>
+                </a:r>
+                <a:endParaRPr lang="zh-TW" altLang="en-US" dirty="0"/>
+              </a:p>
+            </p:txBody>
+          </p:sp>
+          <p:sp>
+            <p:nvSpPr>
+              <p:cNvPr id="20" name="文字方塊 19">
+                <a:extLst>
+                  <a:ext uri="{FF2B5EF4-FFF2-40B4-BE49-F238E27FC236}">
+                    <a16:creationId xmlns:a16="http://schemas.microsoft.com/office/drawing/2014/main" id="{29AA0ED3-BAB2-47F7-BB34-63618C606553}"/>
+                  </a:ext>
+                </a:extLst>
+              </p:cNvPr>
+              <p:cNvSpPr txBox="1"/>
+              <p:nvPr/>
+            </p:nvSpPr>
+            <p:spPr>
+              <a:xfrm rot="5400000">
+                <a:off x="2686771" y="2554075"/>
+                <a:ext cx="772969" cy="369332"/>
+              </a:xfrm>
+              <a:prstGeom prst="rect">
+                <a:avLst/>
+              </a:prstGeom>
+              <a:noFill/>
+              <a:ln w="19050">
+                <a:solidFill>
+                  <a:schemeClr val="tx1"/>
+                </a:solidFill>
+                <a:prstDash val="dash"/>
+              </a:ln>
+            </p:spPr>
+            <p:txBody>
+              <a:bodyPr wrap="none" rtlCol="0">
+                <a:spAutoFit/>
+              </a:bodyPr>
+              <a:lstStyle/>
+              <a:p>
+                <a:pPr algn="ctr"/>
+                <a:r>
+                  <a:rPr lang="en-US" altLang="zh-TW" dirty="0"/>
+                  <a:t>Cam 7</a:t>
+                </a:r>
+                <a:endParaRPr lang="zh-TW" altLang="en-US" dirty="0"/>
+              </a:p>
+            </p:txBody>
+          </p:sp>
+          <p:sp>
+            <p:nvSpPr>
+              <p:cNvPr id="21" name="文字方塊 20">
+                <a:extLst>
+                  <a:ext uri="{FF2B5EF4-FFF2-40B4-BE49-F238E27FC236}">
+                    <a16:creationId xmlns:a16="http://schemas.microsoft.com/office/drawing/2014/main" id="{B9F17BFB-52DD-499F-84DD-2AADF4E87494}"/>
+                  </a:ext>
+                </a:extLst>
+              </p:cNvPr>
+              <p:cNvSpPr txBox="1"/>
+              <p:nvPr/>
+            </p:nvSpPr>
+            <p:spPr>
+              <a:xfrm rot="5400000">
+                <a:off x="2686771" y="3934595"/>
+                <a:ext cx="772969" cy="369332"/>
+              </a:xfrm>
+              <a:prstGeom prst="rect">
+                <a:avLst/>
+              </a:prstGeom>
+              <a:noFill/>
+              <a:ln w="19050">
+                <a:solidFill>
+                  <a:schemeClr val="tx1"/>
+                </a:solidFill>
+                <a:prstDash val="dash"/>
+              </a:ln>
+            </p:spPr>
+            <p:txBody>
+              <a:bodyPr wrap="none" rtlCol="0">
+                <a:spAutoFit/>
+              </a:bodyPr>
+              <a:lstStyle/>
+              <a:p>
+                <a:pPr algn="ctr"/>
+                <a:r>
+                  <a:rPr lang="en-US" altLang="zh-TW" dirty="0"/>
+                  <a:t>Cam 6</a:t>
+                </a:r>
+                <a:endParaRPr lang="zh-TW" altLang="en-US" dirty="0"/>
+              </a:p>
+            </p:txBody>
+          </p:sp>
+        </p:grpSp>
+        <p:grpSp>
+          <p:nvGrpSpPr>
+            <p:cNvPr id="23" name="群組 22">
+              <a:extLst>
+                <a:ext uri="{FF2B5EF4-FFF2-40B4-BE49-F238E27FC236}">
+                  <a16:creationId xmlns:a16="http://schemas.microsoft.com/office/drawing/2014/main" id="{6CB141C0-82F0-483F-9D30-93341F7F57AE}"/>
+                </a:ext>
+              </a:extLst>
+            </p:cNvPr>
+            <p:cNvGrpSpPr/>
+            <p:nvPr/>
+          </p:nvGrpSpPr>
+          <p:grpSpPr>
+            <a:xfrm>
+              <a:off x="2856000" y="777708"/>
+              <a:ext cx="6480000" cy="410340"/>
+              <a:chOff x="2856000" y="868218"/>
+              <a:chExt cx="6480000" cy="410340"/>
+            </a:xfrm>
+          </p:grpSpPr>
+          <p:cxnSp>
+            <p:nvCxnSpPr>
+              <p:cNvPr id="11" name="直線接點 10">
+                <a:extLst>
+                  <a:ext uri="{FF2B5EF4-FFF2-40B4-BE49-F238E27FC236}">
+                    <a16:creationId xmlns:a16="http://schemas.microsoft.com/office/drawing/2014/main" id="{55FC0032-E60E-44C5-9FA9-715C1FC9F6B1}"/>
+                  </a:ext>
+                </a:extLst>
+              </p:cNvPr>
+              <p:cNvCxnSpPr>
+                <a:cxnSpLocks/>
+              </p:cNvCxnSpPr>
+              <p:nvPr/>
+            </p:nvCxnSpPr>
+            <p:spPr>
+              <a:xfrm flipV="1">
+                <a:off x="2856000" y="868218"/>
+                <a:ext cx="0" cy="410340"/>
+              </a:xfrm>
+              <a:prstGeom prst="line">
+                <a:avLst/>
+              </a:prstGeom>
+              <a:ln w="19050">
+                <a:solidFill>
+                  <a:srgbClr val="2F528F"/>
+                </a:solidFill>
+              </a:ln>
+            </p:spPr>
+            <p:style>
+              <a:lnRef idx="1">
+                <a:schemeClr val="accent1"/>
+              </a:lnRef>
+              <a:fillRef idx="0">
+                <a:schemeClr val="accent1"/>
+              </a:fillRef>
+              <a:effectRef idx="0">
+                <a:schemeClr val="accent1"/>
+              </a:effectRef>
+              <a:fontRef idx="minor">
+                <a:schemeClr val="tx1"/>
+              </a:fontRef>
+            </p:style>
+          </p:cxnSp>
+          <p:cxnSp>
+            <p:nvCxnSpPr>
+              <p:cNvPr id="19" name="直線接點 18">
+                <a:extLst>
+                  <a:ext uri="{FF2B5EF4-FFF2-40B4-BE49-F238E27FC236}">
+                    <a16:creationId xmlns:a16="http://schemas.microsoft.com/office/drawing/2014/main" id="{F9178AA3-954C-4F90-9047-6CD150A241AF}"/>
+                  </a:ext>
+                </a:extLst>
+              </p:cNvPr>
+              <p:cNvCxnSpPr>
+                <a:cxnSpLocks/>
+              </p:cNvCxnSpPr>
+              <p:nvPr/>
+            </p:nvCxnSpPr>
+            <p:spPr>
+              <a:xfrm flipV="1">
+                <a:off x="9336000" y="868218"/>
+                <a:ext cx="0" cy="410340"/>
+              </a:xfrm>
+              <a:prstGeom prst="line">
+                <a:avLst/>
+              </a:prstGeom>
+              <a:ln w="19050">
+                <a:solidFill>
+                  <a:srgbClr val="2F528F"/>
+                </a:solidFill>
+              </a:ln>
+            </p:spPr>
+            <p:style>
+              <a:lnRef idx="1">
+                <a:schemeClr val="accent1"/>
+              </a:lnRef>
+              <a:fillRef idx="0">
+                <a:schemeClr val="accent1"/>
+              </a:fillRef>
+              <a:effectRef idx="0">
+                <a:schemeClr val="accent1"/>
+              </a:effectRef>
+              <a:fontRef idx="minor">
+                <a:schemeClr val="tx1"/>
+              </a:fontRef>
+            </p:style>
+          </p:cxnSp>
+          <p:cxnSp>
+            <p:nvCxnSpPr>
+              <p:cNvPr id="16" name="直線接點 15">
+                <a:extLst>
+                  <a:ext uri="{FF2B5EF4-FFF2-40B4-BE49-F238E27FC236}">
+                    <a16:creationId xmlns:a16="http://schemas.microsoft.com/office/drawing/2014/main" id="{87E7A626-C967-4C2E-8415-D1740F9F446A}"/>
+                  </a:ext>
+                </a:extLst>
+              </p:cNvPr>
+              <p:cNvCxnSpPr>
+                <a:cxnSpLocks/>
+              </p:cNvCxnSpPr>
+              <p:nvPr/>
+            </p:nvCxnSpPr>
+            <p:spPr>
+              <a:xfrm>
+                <a:off x="2856000" y="1073388"/>
+                <a:ext cx="6479999" cy="0"/>
+              </a:xfrm>
+              <a:prstGeom prst="line">
+                <a:avLst/>
+              </a:prstGeom>
+              <a:ln w="19050">
+                <a:solidFill>
+                  <a:srgbClr val="2F528F"/>
+                </a:solidFill>
+              </a:ln>
+            </p:spPr>
+            <p:style>
+              <a:lnRef idx="1">
+                <a:schemeClr val="accent1"/>
+              </a:lnRef>
+              <a:fillRef idx="0">
+                <a:schemeClr val="accent1"/>
+              </a:fillRef>
+              <a:effectRef idx="0">
+                <a:schemeClr val="accent1"/>
+              </a:effectRef>
+              <a:fontRef idx="minor">
+                <a:schemeClr val="tx1"/>
+              </a:fontRef>
+            </p:style>
+          </p:cxnSp>
+        </p:grpSp>
+        <p:grpSp>
+          <p:nvGrpSpPr>
+            <p:cNvPr id="24" name="群組 23">
+              <a:extLst>
+                <a:ext uri="{FF2B5EF4-FFF2-40B4-BE49-F238E27FC236}">
+                  <a16:creationId xmlns:a16="http://schemas.microsoft.com/office/drawing/2014/main" id="{EBC77ED6-B5D4-408B-B970-07AAE835C5D6}"/>
+                </a:ext>
+              </a:extLst>
+            </p:cNvPr>
+            <p:cNvGrpSpPr/>
+            <p:nvPr/>
+          </p:nvGrpSpPr>
+          <p:grpSpPr>
+            <a:xfrm rot="5400000">
+              <a:off x="7487650" y="3223829"/>
+              <a:ext cx="4320000" cy="410340"/>
+              <a:chOff x="2856000" y="868218"/>
+              <a:chExt cx="6480000" cy="410340"/>
+            </a:xfrm>
+          </p:grpSpPr>
+          <p:cxnSp>
+            <p:nvCxnSpPr>
+              <p:cNvPr id="25" name="直線接點 24">
+                <a:extLst>
+                  <a:ext uri="{FF2B5EF4-FFF2-40B4-BE49-F238E27FC236}">
+                    <a16:creationId xmlns:a16="http://schemas.microsoft.com/office/drawing/2014/main" id="{F67D92EB-19C7-44E1-9DE2-D1DC05B9B92C}"/>
+                  </a:ext>
+                </a:extLst>
+              </p:cNvPr>
+              <p:cNvCxnSpPr>
+                <a:cxnSpLocks/>
+              </p:cNvCxnSpPr>
+              <p:nvPr/>
+            </p:nvCxnSpPr>
+            <p:spPr>
+              <a:xfrm flipV="1">
+                <a:off x="2856000" y="868218"/>
+                <a:ext cx="0" cy="410340"/>
+              </a:xfrm>
+              <a:prstGeom prst="line">
+                <a:avLst/>
+              </a:prstGeom>
+              <a:ln w="19050">
+                <a:solidFill>
+                  <a:srgbClr val="2F528F"/>
+                </a:solidFill>
+              </a:ln>
+            </p:spPr>
+            <p:style>
+              <a:lnRef idx="1">
+                <a:schemeClr val="accent1"/>
+              </a:lnRef>
+              <a:fillRef idx="0">
+                <a:schemeClr val="accent1"/>
+              </a:fillRef>
+              <a:effectRef idx="0">
+                <a:schemeClr val="accent1"/>
+              </a:effectRef>
+              <a:fontRef idx="minor">
+                <a:schemeClr val="tx1"/>
+              </a:fontRef>
+            </p:style>
+          </p:cxnSp>
+          <p:cxnSp>
+            <p:nvCxnSpPr>
+              <p:cNvPr id="26" name="直線接點 25">
+                <a:extLst>
+                  <a:ext uri="{FF2B5EF4-FFF2-40B4-BE49-F238E27FC236}">
+                    <a16:creationId xmlns:a16="http://schemas.microsoft.com/office/drawing/2014/main" id="{56708C5D-401C-4D66-B88E-E91BC12FE717}"/>
+                  </a:ext>
+                </a:extLst>
+              </p:cNvPr>
+              <p:cNvCxnSpPr>
+                <a:cxnSpLocks/>
+              </p:cNvCxnSpPr>
+              <p:nvPr/>
+            </p:nvCxnSpPr>
+            <p:spPr>
+              <a:xfrm flipV="1">
+                <a:off x="9336000" y="868218"/>
+                <a:ext cx="0" cy="410340"/>
+              </a:xfrm>
+              <a:prstGeom prst="line">
+                <a:avLst/>
+              </a:prstGeom>
+              <a:ln w="19050">
+                <a:solidFill>
+                  <a:srgbClr val="2F528F"/>
+                </a:solidFill>
+              </a:ln>
+            </p:spPr>
+            <p:style>
+              <a:lnRef idx="1">
+                <a:schemeClr val="accent1"/>
+              </a:lnRef>
+              <a:fillRef idx="0">
+                <a:schemeClr val="accent1"/>
+              </a:fillRef>
+              <a:effectRef idx="0">
+                <a:schemeClr val="accent1"/>
+              </a:effectRef>
+              <a:fontRef idx="minor">
+                <a:schemeClr val="tx1"/>
+              </a:fontRef>
+            </p:style>
+          </p:cxnSp>
+          <p:cxnSp>
+            <p:nvCxnSpPr>
+              <p:cNvPr id="27" name="直線接點 26">
+                <a:extLst>
+                  <a:ext uri="{FF2B5EF4-FFF2-40B4-BE49-F238E27FC236}">
+                    <a16:creationId xmlns:a16="http://schemas.microsoft.com/office/drawing/2014/main" id="{39D72BCB-A700-4948-BC21-AD66C19422ED}"/>
+                  </a:ext>
+                </a:extLst>
+              </p:cNvPr>
+              <p:cNvCxnSpPr>
+                <a:cxnSpLocks/>
+              </p:cNvCxnSpPr>
+              <p:nvPr/>
+            </p:nvCxnSpPr>
+            <p:spPr>
+              <a:xfrm>
+                <a:off x="2856000" y="1073388"/>
+                <a:ext cx="6479999" cy="0"/>
+              </a:xfrm>
+              <a:prstGeom prst="line">
+                <a:avLst/>
+              </a:prstGeom>
+              <a:ln w="19050">
+                <a:solidFill>
+                  <a:srgbClr val="2F528F"/>
+                </a:solidFill>
+              </a:ln>
+            </p:spPr>
+            <p:style>
+              <a:lnRef idx="1">
+                <a:schemeClr val="accent1"/>
+              </a:lnRef>
+              <a:fillRef idx="0">
+                <a:schemeClr val="accent1"/>
+              </a:fillRef>
+              <a:effectRef idx="0">
+                <a:schemeClr val="accent1"/>
+              </a:effectRef>
+              <a:fontRef idx="minor">
+                <a:schemeClr val="tx1"/>
+              </a:fontRef>
+            </p:style>
+          </p:cxnSp>
+        </p:grpSp>
         <p:sp>
           <p:nvSpPr>
-            <p:cNvPr id="6" name="文字方塊 5">
+            <p:cNvPr id="28" name="文字方塊 27">
               <a:extLst>
                 <a:ext uri="{FF2B5EF4-FFF2-40B4-BE49-F238E27FC236}">
-                  <a16:creationId xmlns:a16="http://schemas.microsoft.com/office/drawing/2014/main" id="{821372EA-6A4F-405A-9FBE-224086C8DF1D}"/>
+                  <a16:creationId xmlns:a16="http://schemas.microsoft.com/office/drawing/2014/main" id="{6F75B9AB-FA59-49AA-8FFF-C7845F7AB754}"/>
                 </a:ext>
               </a:extLst>
             </p:cNvPr>
@@ -4103,29 +4768,23 @@
           </p:nvSpPr>
           <p:spPr>
             <a:xfrm>
-              <a:off x="6836388" y="5110263"/>
-              <a:ext cx="772969" cy="369332"/>
+              <a:off x="9647649" y="3232150"/>
+              <a:ext cx="461665" cy="393698"/>
             </a:xfrm>
             <a:prstGeom prst="rect">
               <a:avLst/>
             </a:prstGeom>
             <a:noFill/>
-            <a:ln w="19050">
-              <a:solidFill>
-                <a:schemeClr val="tx1"/>
-              </a:solidFill>
-              <a:prstDash val="dash"/>
-            </a:ln>
           </p:spPr>
           <p:txBody>
-            <a:bodyPr wrap="none" rtlCol="0">
+            <a:bodyPr vert="eaVert" wrap="none" rtlCol="0">
               <a:spAutoFit/>
             </a:bodyPr>
             <a:lstStyle/>
             <a:p>
               <a:r>
                 <a:rPr lang="en-US" altLang="zh-TW" dirty="0"/>
-                <a:t>Cam 4</a:t>
+                <a:t>4m</a:t>
               </a:r>
               <a:endParaRPr lang="zh-TW" altLang="en-US" dirty="0"/>
             </a:p>
@@ -4133,10 +4792,10 @@
         </p:sp>
         <p:sp>
           <p:nvSpPr>
-            <p:cNvPr id="7" name="文字方塊 6">
+            <p:cNvPr id="29" name="文字方塊 28">
               <a:extLst>
                 <a:ext uri="{FF2B5EF4-FFF2-40B4-BE49-F238E27FC236}">
-                  <a16:creationId xmlns:a16="http://schemas.microsoft.com/office/drawing/2014/main" id="{2A49969F-C1BB-44CD-903A-FC1BE547F095}"/>
+                  <a16:creationId xmlns:a16="http://schemas.microsoft.com/office/drawing/2014/main" id="{00342123-DFCB-48A6-9FFE-A6ECC949E715}"/>
                 </a:ext>
               </a:extLst>
             </p:cNvPr>
@@ -4144,282 +4803,24 @@
             <p:nvPr/>
           </p:nvSpPr>
           <p:spPr>
-            <a:xfrm>
-              <a:off x="4702710" y="5101149"/>
-              <a:ext cx="772969" cy="369332"/>
+            <a:xfrm rot="16200000">
+              <a:off x="5865167" y="580858"/>
+              <a:ext cx="461665" cy="393698"/>
             </a:xfrm>
             <a:prstGeom prst="rect">
               <a:avLst/>
             </a:prstGeom>
             <a:noFill/>
-            <a:ln w="19050">
-              <a:solidFill>
-                <a:schemeClr val="tx1"/>
-              </a:solidFill>
-              <a:prstDash val="dash"/>
-            </a:ln>
           </p:spPr>
           <p:txBody>
-            <a:bodyPr wrap="none" rtlCol="0">
+            <a:bodyPr vert="eaVert" wrap="none" rtlCol="0">
               <a:spAutoFit/>
             </a:bodyPr>
             <a:lstStyle/>
             <a:p>
               <a:r>
                 <a:rPr lang="en-US" altLang="zh-TW" dirty="0"/>
-                <a:t>Cam 5</a:t>
-              </a:r>
-              <a:endParaRPr lang="zh-TW" altLang="en-US" dirty="0"/>
-            </a:p>
-          </p:txBody>
-        </p:sp>
-        <p:sp>
-          <p:nvSpPr>
-            <p:cNvPr id="8" name="文字方塊 7">
-              <a:extLst>
-                <a:ext uri="{FF2B5EF4-FFF2-40B4-BE49-F238E27FC236}">
-                  <a16:creationId xmlns:a16="http://schemas.microsoft.com/office/drawing/2014/main" id="{2CB63C69-8CDE-4493-A986-3A9712A7E493}"/>
-                </a:ext>
-              </a:extLst>
-            </p:cNvPr>
-            <p:cNvSpPr txBox="1"/>
-            <p:nvPr/>
-          </p:nvSpPr>
-          <p:spPr>
-            <a:xfrm>
-              <a:off x="6836388" y="1378405"/>
-              <a:ext cx="772969" cy="369332"/>
-            </a:xfrm>
-            <a:prstGeom prst="rect">
-              <a:avLst/>
-            </a:prstGeom>
-            <a:noFill/>
-            <a:ln w="19050">
-              <a:solidFill>
-                <a:schemeClr val="tx1"/>
-              </a:solidFill>
-              <a:prstDash val="dash"/>
-            </a:ln>
-          </p:spPr>
-          <p:txBody>
-            <a:bodyPr wrap="none" rtlCol="0">
-              <a:spAutoFit/>
-            </a:bodyPr>
-            <a:lstStyle/>
-            <a:p>
-              <a:r>
-                <a:rPr lang="en-US" altLang="zh-TW" dirty="0"/>
-                <a:t>Cam 1</a:t>
-              </a:r>
-              <a:endParaRPr lang="zh-TW" altLang="en-US" dirty="0"/>
-            </a:p>
-          </p:txBody>
-        </p:sp>
-        <p:sp>
-          <p:nvSpPr>
-            <p:cNvPr id="9" name="文字方塊 8">
-              <a:extLst>
-                <a:ext uri="{FF2B5EF4-FFF2-40B4-BE49-F238E27FC236}">
-                  <a16:creationId xmlns:a16="http://schemas.microsoft.com/office/drawing/2014/main" id="{EFA2F1C9-CD76-482F-9B76-1CF5F88CDFF9}"/>
-                </a:ext>
-              </a:extLst>
-            </p:cNvPr>
-            <p:cNvSpPr txBox="1"/>
-            <p:nvPr/>
-          </p:nvSpPr>
-          <p:spPr>
-            <a:xfrm>
-              <a:off x="4702710" y="1369291"/>
-              <a:ext cx="772969" cy="369332"/>
-            </a:xfrm>
-            <a:prstGeom prst="rect">
-              <a:avLst/>
-            </a:prstGeom>
-            <a:noFill/>
-            <a:ln w="19050">
-              <a:solidFill>
-                <a:schemeClr val="tx1"/>
-              </a:solidFill>
-              <a:prstDash val="dash"/>
-            </a:ln>
-          </p:spPr>
-          <p:txBody>
-            <a:bodyPr wrap="none" rtlCol="0">
-              <a:spAutoFit/>
-            </a:bodyPr>
-            <a:lstStyle/>
-            <a:p>
-              <a:r>
-                <a:rPr lang="en-US" altLang="zh-TW" dirty="0"/>
-                <a:t>Cam 8</a:t>
-              </a:r>
-              <a:endParaRPr lang="zh-TW" altLang="en-US" dirty="0"/>
-            </a:p>
-          </p:txBody>
-        </p:sp>
-        <p:sp>
-          <p:nvSpPr>
-            <p:cNvPr id="10" name="文字方塊 9">
-              <a:extLst>
-                <a:ext uri="{FF2B5EF4-FFF2-40B4-BE49-F238E27FC236}">
-                  <a16:creationId xmlns:a16="http://schemas.microsoft.com/office/drawing/2014/main" id="{D20467EE-5F96-4B24-81C2-5026CD7C9FCB}"/>
-                </a:ext>
-              </a:extLst>
-            </p:cNvPr>
-            <p:cNvSpPr txBox="1"/>
-            <p:nvPr/>
-          </p:nvSpPr>
-          <p:spPr>
-            <a:xfrm rot="5400000">
-              <a:off x="8278849" y="2586124"/>
-              <a:ext cx="772969" cy="369332"/>
-            </a:xfrm>
-            <a:prstGeom prst="rect">
-              <a:avLst/>
-            </a:prstGeom>
-            <a:noFill/>
-            <a:ln w="19050">
-              <a:solidFill>
-                <a:schemeClr val="tx1"/>
-              </a:solidFill>
-              <a:prstDash val="dash"/>
-            </a:ln>
-          </p:spPr>
-          <p:txBody>
-            <a:bodyPr wrap="none" rtlCol="0">
-              <a:spAutoFit/>
-            </a:bodyPr>
-            <a:lstStyle/>
-            <a:p>
-              <a:r>
-                <a:rPr lang="en-US" altLang="zh-TW" dirty="0"/>
-                <a:t>Cam 2</a:t>
-              </a:r>
-              <a:endParaRPr lang="zh-TW" altLang="en-US" dirty="0"/>
-            </a:p>
-          </p:txBody>
-        </p:sp>
-        <p:sp>
-          <p:nvSpPr>
-            <p:cNvPr id="13" name="文字方塊 12">
-              <a:extLst>
-                <a:ext uri="{FF2B5EF4-FFF2-40B4-BE49-F238E27FC236}">
-                  <a16:creationId xmlns:a16="http://schemas.microsoft.com/office/drawing/2014/main" id="{6DC3B236-142F-4D02-BC49-F2C340B64E40}"/>
-                </a:ext>
-              </a:extLst>
-            </p:cNvPr>
-            <p:cNvSpPr txBox="1"/>
-            <p:nvPr/>
-          </p:nvSpPr>
-          <p:spPr>
-            <a:xfrm rot="5400000">
-              <a:off x="8278849" y="3902545"/>
-              <a:ext cx="772969" cy="369332"/>
-            </a:xfrm>
-            <a:prstGeom prst="rect">
-              <a:avLst/>
-            </a:prstGeom>
-            <a:noFill/>
-            <a:ln w="19050">
-              <a:solidFill>
-                <a:schemeClr val="tx1"/>
-              </a:solidFill>
-              <a:prstDash val="dash"/>
-            </a:ln>
-          </p:spPr>
-          <p:txBody>
-            <a:bodyPr wrap="none" rtlCol="0">
-              <a:spAutoFit/>
-            </a:bodyPr>
-            <a:lstStyle/>
-            <a:p>
-              <a:r>
-                <a:rPr lang="en-US" altLang="zh-TW" dirty="0"/>
-                <a:t>Cam 3</a:t>
-              </a:r>
-              <a:endParaRPr lang="zh-TW" altLang="en-US" dirty="0"/>
-            </a:p>
-          </p:txBody>
-        </p:sp>
-        <p:sp>
-          <p:nvSpPr>
-            <p:cNvPr id="20" name="文字方塊 19">
-              <a:extLst>
-                <a:ext uri="{FF2B5EF4-FFF2-40B4-BE49-F238E27FC236}">
-                  <a16:creationId xmlns:a16="http://schemas.microsoft.com/office/drawing/2014/main" id="{29AA0ED3-BAB2-47F7-BB34-63618C606553}"/>
-                </a:ext>
-              </a:extLst>
-            </p:cNvPr>
-            <p:cNvSpPr txBox="1"/>
-            <p:nvPr/>
-          </p:nvSpPr>
-          <p:spPr>
-            <a:xfrm rot="5400000">
-              <a:off x="3140183" y="2586125"/>
-              <a:ext cx="772969" cy="369332"/>
-            </a:xfrm>
-            <a:prstGeom prst="rect">
-              <a:avLst/>
-            </a:prstGeom>
-            <a:noFill/>
-            <a:ln w="19050">
-              <a:solidFill>
-                <a:schemeClr val="tx1"/>
-              </a:solidFill>
-              <a:prstDash val="dash"/>
-            </a:ln>
-          </p:spPr>
-          <p:txBody>
-            <a:bodyPr wrap="none" rtlCol="0">
-              <a:spAutoFit/>
-            </a:bodyPr>
-            <a:lstStyle/>
-            <a:p>
-              <a:r>
-                <a:rPr lang="en-US" altLang="zh-TW" dirty="0"/>
-                <a:t>Cam 7</a:t>
-              </a:r>
-              <a:endParaRPr lang="zh-TW" altLang="en-US" dirty="0"/>
-            </a:p>
-          </p:txBody>
-        </p:sp>
-        <p:sp>
-          <p:nvSpPr>
-            <p:cNvPr id="21" name="文字方塊 20">
-              <a:extLst>
-                <a:ext uri="{FF2B5EF4-FFF2-40B4-BE49-F238E27FC236}">
-                  <a16:creationId xmlns:a16="http://schemas.microsoft.com/office/drawing/2014/main" id="{B9F17BFB-52DD-499F-84DD-2AADF4E87494}"/>
-                </a:ext>
-              </a:extLst>
-            </p:cNvPr>
-            <p:cNvSpPr txBox="1"/>
-            <p:nvPr/>
-          </p:nvSpPr>
-          <p:spPr>
-            <a:xfrm rot="5400000">
-              <a:off x="3140183" y="3902546"/>
-              <a:ext cx="772969" cy="369332"/>
-            </a:xfrm>
-            <a:prstGeom prst="rect">
-              <a:avLst/>
-            </a:prstGeom>
-            <a:noFill/>
-            <a:ln w="19050">
-              <a:solidFill>
-                <a:schemeClr val="tx1"/>
-              </a:solidFill>
-              <a:prstDash val="dash"/>
-            </a:ln>
-          </p:spPr>
-          <p:txBody>
-            <a:bodyPr wrap="none" rtlCol="0">
-              <a:spAutoFit/>
-            </a:bodyPr>
-            <a:lstStyle/>
-            <a:p>
-              <a:r>
-                <a:rPr lang="en-US" altLang="zh-TW" dirty="0"/>
-                <a:t>Cam 6</a:t>
+                <a:t>6m</a:t>
               </a:r>
               <a:endParaRPr lang="zh-TW" altLang="en-US" dirty="0"/>
             </a:p>

</xml_diff>